<commit_message>
Fix typo, replace equation
</commit_message>
<xml_diff>
--- a/lsdm presentation/lsdm presentation.pptx
+++ b/lsdm presentation/lsdm presentation.pptx
@@ -148,7 +148,7 @@
   </p:defaultTextStyle>
   <p:extLst>
     <p:ext uri="{EFAFB233-063F-42B5-8137-9DF3F51BA10A}">
-      <p15:sldGuideLst xmlns:p15="http://schemas.microsoft.com/office/powerpoint/2012/main" xmlns="">
+      <p15:sldGuideLst xmlns="" xmlns:p15="http://schemas.microsoft.com/office/powerpoint/2012/main">
         <p15:guide id="1" orient="horz" pos="2160">
           <p15:clr>
             <a:srgbClr val="A4A3A4"/>
@@ -247,7 +247,7 @@
           <a:p>
             <a:fld id="{3AC4B939-504B-4EA1-87F9-128FFE636A01}" type="datetimeFigureOut">
               <a:rPr lang="en-US" smtClean="0"/>
-              <a:t>5/5/14</a:t>
+              <a:t>5/6/14</a:t>
             </a:fld>
             <a:endParaRPr lang="en-US" dirty="0"/>
           </a:p>
@@ -1323,7 +1323,7 @@
             <a:fld id="{57F88A5F-42E7-47C0-91C3-1212BDC78CAF}" type="datetimeFigureOut">
               <a:rPr lang="en-US" smtClean="0"/>
               <a:pPr/>
-              <a:t>5/5/14</a:t>
+              <a:t>5/6/14</a:t>
             </a:fld>
             <a:endParaRPr lang="en-US" dirty="0"/>
           </a:p>
@@ -1495,7 +1495,7 @@
             <a:fld id="{57F88A5F-42E7-47C0-91C3-1212BDC78CAF}" type="datetimeFigureOut">
               <a:rPr lang="en-US" smtClean="0"/>
               <a:pPr/>
-              <a:t>5/5/14</a:t>
+              <a:t>5/6/14</a:t>
             </a:fld>
             <a:endParaRPr lang="en-US" dirty="0"/>
           </a:p>
@@ -1677,7 +1677,7 @@
             <a:fld id="{57F88A5F-42E7-47C0-91C3-1212BDC78CAF}" type="datetimeFigureOut">
               <a:rPr lang="en-US" smtClean="0"/>
               <a:pPr/>
-              <a:t>5/5/14</a:t>
+              <a:t>5/6/14</a:t>
             </a:fld>
             <a:endParaRPr lang="en-US" dirty="0"/>
           </a:p>
@@ -1849,7 +1849,7 @@
             <a:fld id="{57F88A5F-42E7-47C0-91C3-1212BDC78CAF}" type="datetimeFigureOut">
               <a:rPr lang="en-US" smtClean="0"/>
               <a:pPr/>
-              <a:t>5/5/14</a:t>
+              <a:t>5/6/14</a:t>
             </a:fld>
             <a:endParaRPr lang="en-US" dirty="0"/>
           </a:p>
@@ -2097,7 +2097,7 @@
             <a:fld id="{57F88A5F-42E7-47C0-91C3-1212BDC78CAF}" type="datetimeFigureOut">
               <a:rPr lang="en-US" smtClean="0"/>
               <a:pPr/>
-              <a:t>5/5/14</a:t>
+              <a:t>5/6/14</a:t>
             </a:fld>
             <a:endParaRPr lang="en-US" dirty="0"/>
           </a:p>
@@ -2331,7 +2331,7 @@
             <a:fld id="{57F88A5F-42E7-47C0-91C3-1212BDC78CAF}" type="datetimeFigureOut">
               <a:rPr lang="en-US" smtClean="0"/>
               <a:pPr/>
-              <a:t>5/5/14</a:t>
+              <a:t>5/6/14</a:t>
             </a:fld>
             <a:endParaRPr lang="en-US" dirty="0"/>
           </a:p>
@@ -2700,7 +2700,7 @@
             <a:fld id="{57F88A5F-42E7-47C0-91C3-1212BDC78CAF}" type="datetimeFigureOut">
               <a:rPr lang="en-US" smtClean="0"/>
               <a:pPr/>
-              <a:t>5/5/14</a:t>
+              <a:t>5/6/14</a:t>
             </a:fld>
             <a:endParaRPr lang="en-US" dirty="0"/>
           </a:p>
@@ -2820,7 +2820,7 @@
             <a:fld id="{57F88A5F-42E7-47C0-91C3-1212BDC78CAF}" type="datetimeFigureOut">
               <a:rPr lang="en-US" smtClean="0"/>
               <a:pPr/>
-              <a:t>5/5/14</a:t>
+              <a:t>5/6/14</a:t>
             </a:fld>
             <a:endParaRPr lang="en-US" dirty="0"/>
           </a:p>
@@ -2917,7 +2917,7 @@
             <a:fld id="{57F88A5F-42E7-47C0-91C3-1212BDC78CAF}" type="datetimeFigureOut">
               <a:rPr lang="en-US" smtClean="0"/>
               <a:pPr/>
-              <a:t>5/5/14</a:t>
+              <a:t>5/6/14</a:t>
             </a:fld>
             <a:endParaRPr lang="en-US" dirty="0"/>
           </a:p>
@@ -3196,7 +3196,7 @@
             <a:fld id="{57F88A5F-42E7-47C0-91C3-1212BDC78CAF}" type="datetimeFigureOut">
               <a:rPr lang="en-US" smtClean="0"/>
               <a:pPr/>
-              <a:t>5/5/14</a:t>
+              <a:t>5/6/14</a:t>
             </a:fld>
             <a:endParaRPr lang="en-US" dirty="0"/>
           </a:p>
@@ -3451,7 +3451,7 @@
             <a:fld id="{57F88A5F-42E7-47C0-91C3-1212BDC78CAF}" type="datetimeFigureOut">
               <a:rPr lang="en-US" smtClean="0"/>
               <a:pPr/>
-              <a:t>5/5/14</a:t>
+              <a:t>5/6/14</a:t>
             </a:fld>
             <a:endParaRPr lang="en-US" dirty="0"/>
           </a:p>
@@ -3666,7 +3666,7 @@
             <a:fld id="{57F88A5F-42E7-47C0-91C3-1212BDC78CAF}" type="datetimeFigureOut">
               <a:rPr lang="en-US" smtClean="0"/>
               <a:pPr/>
-              <a:t>5/5/14</a:t>
+              <a:t>5/6/14</a:t>
             </a:fld>
             <a:endParaRPr lang="en-US" dirty="0"/>
           </a:p>
@@ -7298,15 +7298,23 @@
             </a:r>
             <a:r>
               <a:rPr lang="en-US" sz="2000" i="1" dirty="0"/>
-              <a:t> (t, t’) aren’t connected with OR pattern  </a:t>
-            </a:r>
-            <a:r>
-              <a:rPr lang="en-US" sz="2000" b="1" i="1" dirty="0"/>
-              <a:t>or</a:t>
+              <a:t> (t, t’) aren’t connected with OR </a:t>
+            </a:r>
+            <a:r>
+              <a:rPr lang="en-US" sz="2000" i="1" dirty="0" smtClean="0"/>
+              <a:t>pattern </a:t>
+            </a:r>
+            <a:r>
+              <a:rPr lang="en-US" sz="2000" b="1" i="1" dirty="0" smtClean="0"/>
+              <a:t>and </a:t>
+            </a:r>
+            <a:r>
+              <a:rPr lang="en-US" sz="2000" i="1" dirty="0" smtClean="0"/>
+              <a:t>t</a:t>
             </a:r>
             <a:r>
               <a:rPr lang="en-US" sz="2000" i="1" dirty="0"/>
-              <a:t> t’ isn’t guarded by t in Optional pattern.”</a:t>
+              <a:t>’ isn’t guarded by t in Optional pattern.”</a:t>
             </a:r>
           </a:p>
           <a:p>
@@ -7504,73 +7512,60 @@
           </a:p>
         </p:txBody>
       </p:sp>
+      <p:sp>
+        <p:nvSpPr>
+          <p:cNvPr id="9" name="TextBox 8"/>
+          <p:cNvSpPr txBox="1"/>
+          <p:nvPr/>
+        </p:nvSpPr>
+        <p:spPr>
+          <a:xfrm>
+            <a:off x="2133600" y="304801"/>
+            <a:ext cx="8077200" cy="584775"/>
+          </a:xfrm>
+          <a:prstGeom prst="rect">
+            <a:avLst/>
+          </a:prstGeom>
+          <a:noFill/>
+        </p:spPr>
+        <p:txBody>
+          <a:bodyPr wrap="square" rtlCol="0">
+            <a:spAutoFit/>
+          </a:bodyPr>
+          <a:lstStyle/>
+          <a:p>
+            <a:pPr algn="ctr"/>
+            <a:r>
+              <a:rPr lang="en-US" sz="3200" dirty="0"/>
+              <a:t>Data Flow Builder (4/4)</a:t>
+            </a:r>
+          </a:p>
+        </p:txBody>
+      </p:sp>
       <p:pic>
         <p:nvPicPr>
-          <p:cNvPr id="1033" name="Picture 9"/>
+          <p:cNvPr id="2" name="Picture 1"/>
           <p:cNvPicPr>
-            <a:picLocks noChangeAspect="1" noChangeArrowheads="1"/>
+            <a:picLocks noChangeAspect="1"/>
           </p:cNvPicPr>
           <p:nvPr/>
         </p:nvPicPr>
         <p:blipFill>
-          <a:blip r:embed="rId2">
-            <a:clrChange>
-              <a:clrFrom>
-                <a:srgbClr val="FFFFFF"/>
-              </a:clrFrom>
-              <a:clrTo>
-                <a:srgbClr val="FFFFFF">
-                  <a:alpha val="0"/>
-                </a:srgbClr>
-              </a:clrTo>
-            </a:clrChange>
-          </a:blip>
-          <a:srcRect/>
+          <a:blip r:embed="rId2"/>
           <a:stretch>
             <a:fillRect/>
           </a:stretch>
         </p:blipFill>
-        <p:spPr bwMode="auto">
-          <a:xfrm>
-            <a:off x="2286000" y="1752600"/>
-            <a:ext cx="7315200" cy="484450"/>
+        <p:spPr>
+          <a:xfrm>
+            <a:off x="2601688" y="1632857"/>
+            <a:ext cx="7048500" cy="495300"/>
           </a:xfrm>
           <a:prstGeom prst="rect">
             <a:avLst/>
           </a:prstGeom>
-          <a:noFill/>
         </p:spPr>
       </p:pic>
-      <p:sp>
-        <p:nvSpPr>
-          <p:cNvPr id="9" name="TextBox 8"/>
-          <p:cNvSpPr txBox="1"/>
-          <p:nvPr/>
-        </p:nvSpPr>
-        <p:spPr>
-          <a:xfrm>
-            <a:off x="2133600" y="304801"/>
-            <a:ext cx="8077200" cy="584775"/>
-          </a:xfrm>
-          <a:prstGeom prst="rect">
-            <a:avLst/>
-          </a:prstGeom>
-          <a:noFill/>
-        </p:spPr>
-        <p:txBody>
-          <a:bodyPr wrap="square" rtlCol="0">
-            <a:spAutoFit/>
-          </a:bodyPr>
-          <a:lstStyle/>
-          <a:p>
-            <a:pPr algn="ctr"/>
-            <a:r>
-              <a:rPr lang="en-US" sz="3200" dirty="0"/>
-              <a:t>Data Flow Builder (4/4)</a:t>
-            </a:r>
-          </a:p>
-        </p:txBody>
-      </p:sp>
     </p:spTree>
     <p:extLst>
       <p:ext uri="{BB962C8B-B14F-4D97-AF65-F5344CB8AC3E}">
@@ -14462,11 +14457,7 @@
             </a:pPr>
             <a:r>
               <a:rPr lang="en-US" sz="1600" dirty="0" smtClean="0"/>
-              <a:t>SELECT </a:t>
-            </a:r>
-            <a:r>
-              <a:rPr lang="en-US" sz="1600" dirty="0" smtClean="0"/>
-              <a:t>QT1RS.y</a:t>
+              <a:t>SELECT QT1RS.y</a:t>
             </a:r>
             <a:r>
               <a:rPr lang="en-US" sz="1600" dirty="0"/>
@@ -16225,7 +16216,7 @@
   <a:extraClrSchemeLst/>
   <a:extLst>
     <a:ext uri="{05A4C25C-085E-4340-85A3-A5531E510DB2}">
-      <thm15:themeFamily xmlns:thm15="http://schemas.microsoft.com/office/thememl/2012/main" xmlns="" name="Office Theme" id="{62F939B6-93AF-4DB8-9C6B-D6C7DFDC589F}" vid="{4A3C46E8-61CC-4603-A589-7422A47A8E4A}"/>
+      <thm15:themeFamily xmlns="" xmlns:thm15="http://schemas.microsoft.com/office/thememl/2012/main" name="Office Theme" id="{62F939B6-93AF-4DB8-9C6B-D6C7DFDC589F}" vid="{4A3C46E8-61CC-4603-A589-7422A47A8E4A}"/>
     </a:ext>
   </a:extLst>
 </a:theme>

</xml_diff>